<commit_message>
changes in PPT and added news file
</commit_message>
<xml_diff>
--- a/GIT.pptx
+++ b/GIT.pptx
@@ -12,23 +12,26 @@
     <p:sldId id="264" r:id="rId6"/>
     <p:sldId id="261" r:id="rId7"/>
     <p:sldId id="258" r:id="rId8"/>
-    <p:sldId id="259" r:id="rId9"/>
-    <p:sldId id="260" r:id="rId10"/>
+    <p:sldId id="260" r:id="rId9"/>
+    <p:sldId id="259" r:id="rId10"/>
     <p:sldId id="262" r:id="rId11"/>
     <p:sldId id="266" r:id="rId12"/>
     <p:sldId id="265" r:id="rId13"/>
     <p:sldId id="267" r:id="rId14"/>
     <p:sldId id="268" r:id="rId15"/>
-    <p:sldId id="276" r:id="rId16"/>
-    <p:sldId id="277" r:id="rId17"/>
-    <p:sldId id="278" r:id="rId18"/>
-    <p:sldId id="270" r:id="rId19"/>
+    <p:sldId id="270" r:id="rId16"/>
+    <p:sldId id="276" r:id="rId17"/>
+    <p:sldId id="277" r:id="rId18"/>
+    <p:sldId id="278" r:id="rId19"/>
     <p:sldId id="271" r:id="rId20"/>
     <p:sldId id="272" r:id="rId21"/>
     <p:sldId id="273" r:id="rId22"/>
-    <p:sldId id="275" r:id="rId23"/>
-    <p:sldId id="274" r:id="rId24"/>
-    <p:sldId id="279" r:id="rId25"/>
+    <p:sldId id="281" r:id="rId23"/>
+    <p:sldId id="275" r:id="rId24"/>
+    <p:sldId id="274" r:id="rId25"/>
+    <p:sldId id="279" r:id="rId26"/>
+    <p:sldId id="280" r:id="rId27"/>
+    <p:sldId id="282" r:id="rId28"/>
   </p:sldIdLst>
   <p:sldSz cx="9144000" cy="6858000" type="screen4x3"/>
   <p:notesSz cx="6858000" cy="9144000"/>
@@ -3763,7 +3766,7 @@
 </file>
 
 <file path=ppt/slides/slide11.xml><?xml version="1.0" encoding="utf-8"?>
-<p:sld xmlns:a="http://schemas.openxmlformats.org/drawingml/2006/main" xmlns:r="http://schemas.openxmlformats.org/officeDocument/2006/relationships" xmlns:p="http://schemas.openxmlformats.org/presentationml/2006/main">
+<p:sld xmlns:a="http://schemas.openxmlformats.org/drawingml/2006/main" xmlns:r="http://schemas.openxmlformats.org/officeDocument/2006/relationships" xmlns:p="http://schemas.openxmlformats.org/presentationml/2006/main" show="0">
   <p:cSld>
     <p:spTree>
       <p:nvGrpSpPr>
@@ -3934,6 +3937,7 @@
   <p:clrMapOvr>
     <a:masterClrMapping/>
   </p:clrMapOvr>
+  <p:transition/>
   <p:timing>
     <p:tnLst>
       <p:par>
@@ -4210,11 +4214,7 @@
             </a:pPr>
             <a:r>
               <a:rPr lang="en-US" dirty="0" smtClean="0"/>
-              <a:t> </a:t>
-            </a:r>
-            <a:r>
-              <a:rPr lang="en-US" dirty="0" smtClean="0"/>
-              <a:t>It Helps in coordinating work among several people on a project and tracing progress over time</a:t>
+              <a:t> It Helps in coordinating work among several people on a project and tracing progress over time</a:t>
             </a:r>
           </a:p>
           <a:p>
@@ -4278,6 +4278,79 @@
 <file path=ppt/slides/slide15.xml><?xml version="1.0" encoding="utf-8"?>
 <p:sld xmlns:a="http://schemas.openxmlformats.org/drawingml/2006/main" xmlns:r="http://schemas.openxmlformats.org/officeDocument/2006/relationships" xmlns:p="http://schemas.openxmlformats.org/presentationml/2006/main">
   <p:cSld>
+    <p:bg>
+      <p:bgPr>
+        <a:blipFill dpi="0" rotWithShape="1">
+          <a:blip r:embed="rId2">
+            <a:alphaModFix amt="88000"/>
+            <a:lum/>
+          </a:blip>
+          <a:srcRect/>
+          <a:tile tx="0" ty="0" sx="100000" sy="100000" flip="none" algn="tl"/>
+        </a:blipFill>
+        <a:effectLst/>
+      </p:bgPr>
+    </p:bg>
+    <p:spTree>
+      <p:nvGrpSpPr>
+        <p:cNvPr id="1" name=""/>
+        <p:cNvGrpSpPr/>
+        <p:nvPr/>
+      </p:nvGrpSpPr>
+      <p:grpSpPr>
+        <a:xfrm>
+          <a:off x="0" y="0"/>
+          <a:ext cx="0" cy="0"/>
+          <a:chOff x="0" y="0"/>
+          <a:chExt cx="0" cy="0"/>
+        </a:xfrm>
+      </p:grpSpPr>
+      <p:pic>
+        <p:nvPicPr>
+          <p:cNvPr id="4098" name="Picture 2"/>
+          <p:cNvPicPr>
+            <a:picLocks noGrp="1" noChangeAspect="1" noChangeArrowheads="1"/>
+          </p:cNvPicPr>
+          <p:nvPr>
+            <p:ph idx="1"/>
+          </p:nvPr>
+        </p:nvPicPr>
+        <p:blipFill>
+          <a:blip r:embed="rId3"/>
+          <a:srcRect/>
+          <a:stretch>
+            <a:fillRect/>
+          </a:stretch>
+        </p:blipFill>
+        <p:spPr bwMode="auto">
+          <a:xfrm>
+            <a:off x="357158" y="1071546"/>
+            <a:ext cx="7500990" cy="4000528"/>
+          </a:xfrm>
+          <a:prstGeom prst="rect">
+            <a:avLst/>
+          </a:prstGeom>
+          <a:noFill/>
+          <a:ln w="9525">
+            <a:noFill/>
+            <a:miter lim="800000"/>
+            <a:headEnd/>
+            <a:tailEnd/>
+          </a:ln>
+          <a:effectLst/>
+        </p:spPr>
+      </p:pic>
+    </p:spTree>
+  </p:cSld>
+  <p:clrMapOvr>
+    <a:masterClrMapping/>
+  </p:clrMapOvr>
+</p:sld>
+</file>
+
+<file path=ppt/slides/slide16.xml><?xml version="1.0" encoding="utf-8"?>
+<p:sld xmlns:a="http://schemas.openxmlformats.org/drawingml/2006/main" xmlns:r="http://schemas.openxmlformats.org/officeDocument/2006/relationships" xmlns:p="http://schemas.openxmlformats.org/presentationml/2006/main">
+  <p:cSld>
     <p:spTree>
       <p:nvGrpSpPr>
         <p:cNvPr id="1" name=""/>
@@ -4369,7 +4442,7 @@
 </p:sld>
 </file>
 
-<file path=ppt/slides/slide16.xml><?xml version="1.0" encoding="utf-8"?>
+<file path=ppt/slides/slide17.xml><?xml version="1.0" encoding="utf-8"?>
 <p:sld xmlns:a="http://schemas.openxmlformats.org/drawingml/2006/main" xmlns:r="http://schemas.openxmlformats.org/officeDocument/2006/relationships" xmlns:p="http://schemas.openxmlformats.org/presentationml/2006/main">
   <p:cSld>
     <p:spTree>
@@ -4446,7 +4519,7 @@
 </p:sld>
 </file>
 
-<file path=ppt/slides/slide17.xml><?xml version="1.0" encoding="utf-8"?>
+<file path=ppt/slides/slide18.xml><?xml version="1.0" encoding="utf-8"?>
 <p:sld xmlns:a="http://schemas.openxmlformats.org/drawingml/2006/main" xmlns:r="http://schemas.openxmlformats.org/officeDocument/2006/relationships" xmlns:p="http://schemas.openxmlformats.org/presentationml/2006/main">
   <p:cSld>
     <p:spTree>
@@ -4484,66 +4557,6 @@
             <a:off x="214282" y="1285860"/>
             <a:ext cx="7929618" cy="4572032"/>
           </a:xfrm>
-        </p:spPr>
-      </p:pic>
-    </p:spTree>
-  </p:cSld>
-  <p:clrMapOvr>
-    <a:masterClrMapping/>
-  </p:clrMapOvr>
-</p:sld>
-</file>
-
-<file path=ppt/slides/slide18.xml><?xml version="1.0" encoding="utf-8"?>
-<p:sld xmlns:a="http://schemas.openxmlformats.org/drawingml/2006/main" xmlns:r="http://schemas.openxmlformats.org/officeDocument/2006/relationships" xmlns:p="http://schemas.openxmlformats.org/presentationml/2006/main">
-  <p:cSld>
-    <p:spTree>
-      <p:nvGrpSpPr>
-        <p:cNvPr id="1" name=""/>
-        <p:cNvGrpSpPr/>
-        <p:nvPr/>
-      </p:nvGrpSpPr>
-      <p:grpSpPr>
-        <a:xfrm>
-          <a:off x="0" y="0"/>
-          <a:ext cx="0" cy="0"/>
-          <a:chOff x="0" y="0"/>
-          <a:chExt cx="0" cy="0"/>
-        </a:xfrm>
-      </p:grpSpPr>
-      <p:pic>
-        <p:nvPicPr>
-          <p:cNvPr id="4098" name="Picture 2"/>
-          <p:cNvPicPr>
-            <a:picLocks noGrp="1" noChangeAspect="1" noChangeArrowheads="1"/>
-          </p:cNvPicPr>
-          <p:nvPr>
-            <p:ph idx="1"/>
-          </p:nvPr>
-        </p:nvPicPr>
-        <p:blipFill>
-          <a:blip r:embed="rId2"/>
-          <a:srcRect/>
-          <a:stretch>
-            <a:fillRect/>
-          </a:stretch>
-        </p:blipFill>
-        <p:spPr bwMode="auto">
-          <a:xfrm>
-            <a:off x="357158" y="1071546"/>
-            <a:ext cx="7239000" cy="2996833"/>
-          </a:xfrm>
-          <a:prstGeom prst="rect">
-            <a:avLst/>
-          </a:prstGeom>
-          <a:noFill/>
-          <a:ln w="9525">
-            <a:noFill/>
-            <a:miter lim="800000"/>
-            <a:headEnd/>
-            <a:tailEnd/>
-          </a:ln>
-          <a:effectLst/>
         </p:spPr>
       </p:pic>
     </p:spTree>
@@ -4671,7 +4684,6 @@
               <a:rPr lang="en-US" sz="1800" b="1" dirty="0" smtClean="0"/>
               <a:t> --global user.name "John Doe" </a:t>
             </a:r>
-            <a:endParaRPr lang="en-US" sz="1800" b="1" dirty="0" smtClean="0"/>
           </a:p>
           <a:p>
             <a:r>
@@ -4757,11 +4769,7 @@
             </a:r>
             <a:r>
               <a:rPr lang="en-US" sz="1800" dirty="0" smtClean="0"/>
-              <a:t> when you create a new repository with </a:t>
-            </a:r>
-            <a:r>
-              <a:rPr lang="en-US" sz="1800" dirty="0" smtClean="0"/>
-              <a:t>”</a:t>
+              <a:t> when you create a new repository with ”</a:t>
             </a:r>
             <a:r>
               <a:rPr lang="en-US" sz="1800" dirty="0" err="1" smtClean="0"/>
@@ -5039,11 +5047,7 @@
             </a:r>
             <a:r>
               <a:rPr lang="en-US" dirty="0" smtClean="0"/>
-              <a:t> can find at that </a:t>
-            </a:r>
-            <a:r>
-              <a:rPr lang="en-US" dirty="0" smtClean="0"/>
-              <a:t>point</a:t>
+              <a:t> can find at that point</a:t>
             </a:r>
           </a:p>
           <a:p>
@@ -5184,11 +5188,7 @@
             </a:br>
             <a:r>
               <a:rPr lang="en-US" dirty="0" smtClean="0"/>
-              <a:t>	</a:t>
-            </a:r>
-            <a:r>
-              <a:rPr lang="en-US" dirty="0" smtClean="0"/>
-              <a:t>						</a:t>
+              <a:t>							</a:t>
             </a:r>
             <a:endParaRPr lang="en-US" dirty="0"/>
           </a:p>
@@ -5280,6 +5280,307 @@
             <a:spLocks noGrp="1"/>
           </p:cNvSpPr>
           <p:nvPr>
+            <p:ph type="title"/>
+          </p:nvPr>
+        </p:nvSpPr>
+        <p:spPr/>
+        <p:txBody>
+          <a:bodyPr/>
+          <a:lstStyle/>
+          <a:p>
+            <a:r>
+              <a:rPr lang="en-US" dirty="0" smtClean="0"/>
+              <a:t>Practical commands</a:t>
+            </a:r>
+            <a:endParaRPr lang="en-US" dirty="0"/>
+          </a:p>
+        </p:txBody>
+      </p:sp>
+      <p:sp>
+        <p:nvSpPr>
+          <p:cNvPr id="3" name="Content Placeholder 2"/>
+          <p:cNvSpPr>
+            <a:spLocks noGrp="1"/>
+          </p:cNvSpPr>
+          <p:nvPr>
+            <p:ph idx="1"/>
+          </p:nvPr>
+        </p:nvSpPr>
+        <p:spPr/>
+        <p:txBody>
+          <a:bodyPr>
+            <a:normAutofit fontScale="62500" lnSpcReduction="20000"/>
+          </a:bodyPr>
+          <a:lstStyle/>
+          <a:p>
+            <a:r>
+              <a:rPr lang="en-US" dirty="0" smtClean="0"/>
+              <a:t> </a:t>
+            </a:r>
+            <a:r>
+              <a:rPr lang="en-US" dirty="0" err="1" smtClean="0"/>
+              <a:t>mkdir</a:t>
+            </a:r>
+            <a:r>
+              <a:rPr lang="en-US" dirty="0" smtClean="0"/>
+              <a:t> </a:t>
+            </a:r>
+            <a:r>
+              <a:rPr lang="en-US" dirty="0" err="1" smtClean="0"/>
+              <a:t>chages</a:t>
+            </a:r>
+            <a:endParaRPr lang="en-US" dirty="0" smtClean="0"/>
+          </a:p>
+          <a:p>
+            <a:r>
+              <a:rPr lang="en-US" dirty="0" smtClean="0"/>
+              <a:t>  557  </a:t>
+            </a:r>
+            <a:r>
+              <a:rPr lang="en-US" dirty="0" err="1" smtClean="0"/>
+              <a:t>cd</a:t>
+            </a:r>
+            <a:r>
+              <a:rPr lang="en-US" dirty="0" smtClean="0"/>
+              <a:t> </a:t>
+            </a:r>
+            <a:r>
+              <a:rPr lang="en-US" dirty="0" err="1" smtClean="0"/>
+              <a:t>chages</a:t>
+            </a:r>
+            <a:r>
+              <a:rPr lang="en-US" dirty="0" smtClean="0"/>
+              <a:t>/</a:t>
+            </a:r>
+          </a:p>
+          <a:p>
+            <a:r>
+              <a:rPr lang="en-US" dirty="0" smtClean="0"/>
+              <a:t>  558  </a:t>
+            </a:r>
+            <a:r>
+              <a:rPr lang="en-US" dirty="0" err="1" smtClean="0"/>
+              <a:t>git</a:t>
+            </a:r>
+            <a:r>
+              <a:rPr lang="en-US" dirty="0" smtClean="0"/>
+              <a:t> init</a:t>
+            </a:r>
+          </a:p>
+          <a:p>
+            <a:r>
+              <a:rPr lang="en-US" dirty="0" smtClean="0"/>
+              <a:t>  559  </a:t>
+            </a:r>
+            <a:r>
+              <a:rPr lang="en-US" dirty="0" err="1" smtClean="0"/>
+              <a:t>git</a:t>
+            </a:r>
+            <a:r>
+              <a:rPr lang="en-US" dirty="0" smtClean="0"/>
+              <a:t> pull https://github.com/tiruvedi/firstrepo.git</a:t>
+            </a:r>
+          </a:p>
+          <a:p>
+            <a:r>
+              <a:rPr lang="en-US" dirty="0" smtClean="0"/>
+              <a:t>  560   </a:t>
+            </a:r>
+            <a:r>
+              <a:rPr lang="en-US" dirty="0" err="1" smtClean="0"/>
+              <a:t>ll</a:t>
+            </a:r>
+            <a:endParaRPr lang="en-US" dirty="0" smtClean="0"/>
+          </a:p>
+          <a:p>
+            <a:r>
+              <a:rPr lang="en-US" dirty="0" smtClean="0"/>
+              <a:t>  561  </a:t>
+            </a:r>
+            <a:r>
+              <a:rPr lang="en-US" dirty="0" err="1" smtClean="0"/>
+              <a:t>ls</a:t>
+            </a:r>
+            <a:r>
+              <a:rPr lang="en-US" dirty="0" smtClean="0"/>
+              <a:t> -la</a:t>
+            </a:r>
+          </a:p>
+          <a:p>
+            <a:r>
+              <a:rPr lang="en-US" dirty="0" smtClean="0"/>
+              <a:t>  562  vi alpha.txt</a:t>
+            </a:r>
+          </a:p>
+          <a:p>
+            <a:r>
+              <a:rPr lang="en-US" dirty="0" smtClean="0"/>
+              <a:t>  563  vi beta.txt</a:t>
+            </a:r>
+          </a:p>
+          <a:p>
+            <a:r>
+              <a:rPr lang="en-US" dirty="0" smtClean="0"/>
+              <a:t>  564  </a:t>
+            </a:r>
+            <a:r>
+              <a:rPr lang="en-US" dirty="0" err="1" smtClean="0"/>
+              <a:t>git</a:t>
+            </a:r>
+            <a:r>
+              <a:rPr lang="en-US" dirty="0" smtClean="0"/>
+              <a:t> status</a:t>
+            </a:r>
+          </a:p>
+          <a:p>
+            <a:r>
+              <a:rPr lang="en-US" dirty="0" smtClean="0"/>
+              <a:t>  565  </a:t>
+            </a:r>
+            <a:r>
+              <a:rPr lang="en-US" dirty="0" err="1" smtClean="0"/>
+              <a:t>git</a:t>
+            </a:r>
+            <a:r>
+              <a:rPr lang="en-US" dirty="0" smtClean="0"/>
+              <a:t> add .</a:t>
+            </a:r>
+          </a:p>
+          <a:p>
+            <a:r>
+              <a:rPr lang="en-US" dirty="0" smtClean="0"/>
+              <a:t>  566  </a:t>
+            </a:r>
+            <a:r>
+              <a:rPr lang="en-US" dirty="0" err="1" smtClean="0"/>
+              <a:t>git</a:t>
+            </a:r>
+            <a:r>
+              <a:rPr lang="en-US" dirty="0" smtClean="0"/>
+              <a:t> commit -m  "changes made"</a:t>
+            </a:r>
+          </a:p>
+          <a:p>
+            <a:r>
+              <a:rPr lang="en-US" dirty="0" smtClean="0"/>
+              <a:t>  567  </a:t>
+            </a:r>
+            <a:r>
+              <a:rPr lang="en-US" dirty="0" err="1" smtClean="0"/>
+              <a:t>git</a:t>
+            </a:r>
+            <a:r>
+              <a:rPr lang="en-US" dirty="0" smtClean="0"/>
+              <a:t> status</a:t>
+            </a:r>
+          </a:p>
+          <a:p>
+            <a:r>
+              <a:rPr lang="en-US" dirty="0" smtClean="0"/>
+              <a:t>  568  </a:t>
+            </a:r>
+            <a:r>
+              <a:rPr lang="en-US" dirty="0" err="1" smtClean="0"/>
+              <a:t>git</a:t>
+            </a:r>
+            <a:r>
+              <a:rPr lang="en-US" dirty="0" smtClean="0"/>
+              <a:t> remove -v</a:t>
+            </a:r>
+          </a:p>
+          <a:p>
+            <a:r>
+              <a:rPr lang="en-US" dirty="0" smtClean="0"/>
+              <a:t>  569  </a:t>
+            </a:r>
+            <a:r>
+              <a:rPr lang="en-US" dirty="0" err="1" smtClean="0"/>
+              <a:t>git</a:t>
+            </a:r>
+            <a:r>
+              <a:rPr lang="en-US" dirty="0" smtClean="0"/>
+              <a:t> remote -v</a:t>
+            </a:r>
+          </a:p>
+          <a:p>
+            <a:r>
+              <a:rPr lang="en-US" dirty="0" smtClean="0"/>
+              <a:t>  570  </a:t>
+            </a:r>
+            <a:r>
+              <a:rPr lang="en-US" dirty="0" err="1" smtClean="0"/>
+              <a:t>git</a:t>
+            </a:r>
+            <a:r>
+              <a:rPr lang="en-US" dirty="0" smtClean="0"/>
+              <a:t> remote add origin https://github.com/tiruvedi/firstrepo.git</a:t>
+            </a:r>
+          </a:p>
+          <a:p>
+            <a:r>
+              <a:rPr lang="en-US" dirty="0" smtClean="0"/>
+              <a:t>  571  </a:t>
+            </a:r>
+            <a:r>
+              <a:rPr lang="en-US" dirty="0" err="1" smtClean="0"/>
+              <a:t>git</a:t>
+            </a:r>
+            <a:r>
+              <a:rPr lang="en-US" dirty="0" smtClean="0"/>
+              <a:t> remote -v</a:t>
+            </a:r>
+          </a:p>
+          <a:p>
+            <a:r>
+              <a:rPr lang="en-US" dirty="0" smtClean="0"/>
+              <a:t>  572  </a:t>
+            </a:r>
+            <a:r>
+              <a:rPr lang="en-US" dirty="0" err="1" smtClean="0"/>
+              <a:t>git</a:t>
+            </a:r>
+            <a:r>
+              <a:rPr lang="en-US" dirty="0" smtClean="0"/>
+              <a:t> push origin master</a:t>
+            </a:r>
+          </a:p>
+          <a:p>
+            <a:endParaRPr lang="en-US" dirty="0"/>
+          </a:p>
+        </p:txBody>
+      </p:sp>
+    </p:spTree>
+  </p:cSld>
+  <p:clrMapOvr>
+    <a:masterClrMapping/>
+  </p:clrMapOvr>
+</p:sld>
+</file>
+
+<file path=ppt/slides/slide23.xml><?xml version="1.0" encoding="utf-8"?>
+<p:sld xmlns:a="http://schemas.openxmlformats.org/drawingml/2006/main" xmlns:r="http://schemas.openxmlformats.org/officeDocument/2006/relationships" xmlns:p="http://schemas.openxmlformats.org/presentationml/2006/main">
+  <p:cSld>
+    <p:spTree>
+      <p:nvGrpSpPr>
+        <p:cNvPr id="1" name=""/>
+        <p:cNvGrpSpPr/>
+        <p:nvPr/>
+      </p:nvGrpSpPr>
+      <p:grpSpPr>
+        <a:xfrm>
+          <a:off x="0" y="0"/>
+          <a:ext cx="0" cy="0"/>
+          <a:chOff x="0" y="0"/>
+          <a:chExt cx="0" cy="0"/>
+        </a:xfrm>
+      </p:grpSpPr>
+      <p:sp>
+        <p:nvSpPr>
+          <p:cNvPr id="2" name="Title 1"/>
+          <p:cNvSpPr>
+            <a:spLocks noGrp="1"/>
+          </p:cNvSpPr>
+          <p:nvPr>
             <p:ph type="ctrTitle"/>
           </p:nvPr>
         </p:nvSpPr>
@@ -5307,11 +5608,7 @@
             </a:br>
             <a:r>
               <a:rPr lang="en-US" dirty="0" smtClean="0"/>
-              <a:t>	</a:t>
-            </a:r>
-            <a:r>
-              <a:rPr lang="en-US" dirty="0" smtClean="0"/>
-              <a:t>						</a:t>
+              <a:t>							</a:t>
             </a:r>
             <a:endParaRPr lang="en-US" dirty="0"/>
           </a:p>
@@ -5377,7 +5674,7 @@
 </p:sld>
 </file>
 
-<file path=ppt/slides/slide23.xml><?xml version="1.0" encoding="utf-8"?>
+<file path=ppt/slides/slide24.xml><?xml version="1.0" encoding="utf-8"?>
 <p:sld xmlns:a="http://schemas.openxmlformats.org/drawingml/2006/main" xmlns:r="http://schemas.openxmlformats.org/officeDocument/2006/relationships" xmlns:p="http://schemas.openxmlformats.org/presentationml/2006/main">
   <p:cSld>
     <p:spTree>
@@ -5491,11 +5788,7 @@
           <a:p>
             <a:r>
               <a:rPr lang="en-US" dirty="0" smtClean="0"/>
-              <a:t>https</a:t>
-            </a:r>
-            <a:r>
-              <a:rPr lang="en-US" dirty="0" smtClean="0"/>
-              <a:t>://stackoverflow.com/questions/10032964/git-push-fatal-no-configured-push-destination</a:t>
+              <a:t>https://stackoverflow.com/questions/10032964/git-push-fatal-no-configured-push-destination</a:t>
             </a:r>
             <a:endParaRPr lang="en-US" dirty="0"/>
           </a:p>
@@ -5509,7 +5802,7 @@
 </p:sld>
 </file>
 
-<file path=ppt/slides/slide24.xml><?xml version="1.0" encoding="utf-8"?>
+<file path=ppt/slides/slide25.xml><?xml version="1.0" encoding="utf-8"?>
 <p:sld xmlns:a="http://schemas.openxmlformats.org/drawingml/2006/main" xmlns:r="http://schemas.openxmlformats.org/officeDocument/2006/relationships" xmlns:p="http://schemas.openxmlformats.org/presentationml/2006/main">
   <p:cSld>
     <p:spTree>
@@ -5590,7 +5883,7 @@
 </p:sld>
 </file>
 
-<file path=ppt/slides/slide3.xml><?xml version="1.0" encoding="utf-8"?>
+<file path=ppt/slides/slide26.xml><?xml version="1.0" encoding="utf-8"?>
 <p:sld xmlns:a="http://schemas.openxmlformats.org/drawingml/2006/main" xmlns:r="http://schemas.openxmlformats.org/officeDocument/2006/relationships" xmlns:p="http://schemas.openxmlformats.org/presentationml/2006/main">
   <p:cSld>
     <p:spTree>
@@ -5607,73 +5900,691 @@
           <a:chExt cx="0" cy="0"/>
         </a:xfrm>
       </p:grpSpPr>
-      <p:sp>
-        <p:nvSpPr>
-          <p:cNvPr id="2" name="Title 1"/>
-          <p:cNvSpPr>
-            <a:spLocks noGrp="1"/>
-          </p:cNvSpPr>
-          <p:nvPr>
-            <p:ph type="title"/>
-          </p:nvPr>
-        </p:nvSpPr>
-        <p:spPr/>
-        <p:txBody>
-          <a:bodyPr>
-            <a:normAutofit/>
-          </a:bodyPr>
-          <a:lstStyle/>
-          <a:p>
-            <a:r>
-              <a:rPr lang="en-US" dirty="0" smtClean="0"/>
-              <a:t>What is VCS</a:t>
-            </a:r>
-            <a:r>
-              <a:rPr lang="en-US" sz="1600" dirty="0" smtClean="0"/>
-              <a:t>(Version control system)</a:t>
-            </a:r>
-            <a:endParaRPr lang="en-US" dirty="0"/>
-          </a:p>
-        </p:txBody>
-      </p:sp>
-      <p:sp>
-        <p:nvSpPr>
-          <p:cNvPr id="3" name="Content Placeholder 2"/>
-          <p:cNvSpPr>
-            <a:spLocks noGrp="1"/>
-          </p:cNvSpPr>
-          <p:nvPr>
-            <p:ph idx="1"/>
-          </p:nvPr>
-        </p:nvSpPr>
-        <p:spPr/>
-        <p:txBody>
-          <a:bodyPr>
-            <a:normAutofit/>
-          </a:bodyPr>
-          <a:lstStyle/>
-          <a:p>
-            <a:r>
-              <a:rPr lang="en-US" sz="2000" dirty="0" smtClean="0"/>
-              <a:t>The management of modifications to documents, computer programs, huge websites, and other collections of information is known as version control, sometimes known as revision control or source control. Each revision has a timestamp and the name of the person who modified it. Revisions can be compared, restored, and merged with some file formats. [1]</a:t>
-            </a:r>
-          </a:p>
-          <a:p>
-            <a:r>
-              <a:rPr lang="en-US" sz="2000" dirty="0" smtClean="0"/>
-              <a:t>VCSs are most typically used as stand-alone applications, but they can also be embedded in other types of software, such as integrated development environments (IDEs).</a:t>
-            </a:r>
-          </a:p>
-          <a:p>
-            <a:endParaRPr lang="en-US" sz="1800" dirty="0"/>
-          </a:p>
-        </p:txBody>
-      </p:sp>
+      <p:pic>
+        <p:nvPicPr>
+          <p:cNvPr id="7" name="Content Placeholder 6" descr="Git_advance.png"/>
+          <p:cNvPicPr>
+            <a:picLocks noGrp="1" noChangeAspect="1"/>
+          </p:cNvPicPr>
+          <p:nvPr>
+            <p:ph sz="half" idx="1"/>
+          </p:nvPr>
+        </p:nvPicPr>
+        <p:blipFill>
+          <a:blip r:embed="rId2" cstate="print"/>
+          <a:stretch>
+            <a:fillRect/>
+          </a:stretch>
+        </p:blipFill>
+        <p:spPr>
+          <a:xfrm>
+            <a:off x="285720" y="1214422"/>
+            <a:ext cx="7239000" cy="4192137"/>
+          </a:xfrm>
+        </p:spPr>
+      </p:pic>
     </p:spTree>
   </p:cSld>
   <p:clrMapOvr>
     <a:masterClrMapping/>
   </p:clrMapOvr>
+</p:sld>
+</file>
+
+<file path=ppt/slides/slide27.xml><?xml version="1.0" encoding="utf-8"?>
+<p:sld xmlns:a="http://schemas.openxmlformats.org/drawingml/2006/main" xmlns:r="http://schemas.openxmlformats.org/officeDocument/2006/relationships" xmlns:p="http://schemas.openxmlformats.org/presentationml/2006/main">
+  <p:cSld>
+    <p:spTree>
+      <p:nvGrpSpPr>
+        <p:cNvPr id="1" name=""/>
+        <p:cNvGrpSpPr/>
+        <p:nvPr/>
+      </p:nvGrpSpPr>
+      <p:grpSpPr>
+        <a:xfrm>
+          <a:off x="0" y="0"/>
+          <a:ext cx="0" cy="0"/>
+          <a:chOff x="0" y="0"/>
+          <a:chExt cx="0" cy="0"/>
+        </a:xfrm>
+      </p:grpSpPr>
+      <p:sp>
+        <p:nvSpPr>
+          <p:cNvPr id="4" name="Content Placeholder 3"/>
+          <p:cNvSpPr>
+            <a:spLocks noGrp="1"/>
+          </p:cNvSpPr>
+          <p:nvPr>
+            <p:ph sz="half" idx="1"/>
+          </p:nvPr>
+        </p:nvSpPr>
+        <p:spPr>
+          <a:xfrm>
+            <a:off x="214282" y="142828"/>
+            <a:ext cx="7429552" cy="6715172"/>
+          </a:xfrm>
+        </p:spPr>
+        <p:txBody>
+          <a:bodyPr>
+            <a:normAutofit fontScale="25000" lnSpcReduction="20000"/>
+          </a:bodyPr>
+          <a:lstStyle/>
+          <a:p>
+            <a:r>
+              <a:rPr lang="en-US" dirty="0" smtClean="0"/>
+              <a:t> </a:t>
+            </a:r>
+            <a:r>
+              <a:rPr lang="en-US" dirty="0" err="1" smtClean="0"/>
+              <a:t>mkdir</a:t>
+            </a:r>
+            <a:r>
+              <a:rPr lang="en-US" dirty="0" smtClean="0"/>
+              <a:t> </a:t>
+            </a:r>
+            <a:r>
+              <a:rPr lang="en-US" dirty="0" err="1" smtClean="0"/>
+              <a:t>git_advance</a:t>
+            </a:r>
+            <a:endParaRPr lang="en-US" dirty="0" smtClean="0"/>
+          </a:p>
+          <a:p>
+            <a:r>
+              <a:rPr lang="en-US" dirty="0" smtClean="0"/>
+              <a:t>  577  </a:t>
+            </a:r>
+            <a:r>
+              <a:rPr lang="en-US" dirty="0" err="1" smtClean="0"/>
+              <a:t>cd</a:t>
+            </a:r>
+            <a:r>
+              <a:rPr lang="en-US" dirty="0" smtClean="0"/>
+              <a:t> </a:t>
+            </a:r>
+            <a:r>
+              <a:rPr lang="en-US" dirty="0" err="1" smtClean="0"/>
+              <a:t>git_advance</a:t>
+            </a:r>
+            <a:r>
+              <a:rPr lang="en-US" dirty="0" smtClean="0"/>
+              <a:t>/</a:t>
+            </a:r>
+          </a:p>
+          <a:p>
+            <a:r>
+              <a:rPr lang="en-US" dirty="0" smtClean="0"/>
+              <a:t>  578  </a:t>
+            </a:r>
+            <a:r>
+              <a:rPr lang="en-US" dirty="0" err="1" smtClean="0"/>
+              <a:t>git</a:t>
+            </a:r>
+            <a:r>
+              <a:rPr lang="en-US" dirty="0" smtClean="0"/>
+              <a:t> init A</a:t>
+            </a:r>
+          </a:p>
+          <a:p>
+            <a:r>
+              <a:rPr lang="en-US" dirty="0" smtClean="0"/>
+              <a:t>  579  </a:t>
+            </a:r>
+            <a:r>
+              <a:rPr lang="en-US" dirty="0" err="1" smtClean="0"/>
+              <a:t>git</a:t>
+            </a:r>
+            <a:r>
+              <a:rPr lang="en-US" dirty="0" smtClean="0"/>
+              <a:t> init B</a:t>
+            </a:r>
+          </a:p>
+          <a:p>
+            <a:r>
+              <a:rPr lang="en-US" dirty="0" smtClean="0"/>
+              <a:t>  580  </a:t>
+            </a:r>
+            <a:r>
+              <a:rPr lang="en-US" dirty="0" err="1" smtClean="0"/>
+              <a:t>cd</a:t>
+            </a:r>
+            <a:r>
+              <a:rPr lang="en-US" dirty="0" smtClean="0"/>
+              <a:t> A</a:t>
+            </a:r>
+          </a:p>
+          <a:p>
+            <a:r>
+              <a:rPr lang="en-US" dirty="0" smtClean="0"/>
+              <a:t>  581  </a:t>
+            </a:r>
+            <a:r>
+              <a:rPr lang="en-US" dirty="0" err="1" smtClean="0"/>
+              <a:t>pwd</a:t>
+            </a:r>
+            <a:endParaRPr lang="en-US" dirty="0" smtClean="0"/>
+          </a:p>
+          <a:p>
+            <a:r>
+              <a:rPr lang="en-US" dirty="0" smtClean="0"/>
+              <a:t>  582  </a:t>
+            </a:r>
+            <a:r>
+              <a:rPr lang="en-US" dirty="0" err="1" smtClean="0"/>
+              <a:t>git</a:t>
+            </a:r>
+            <a:r>
+              <a:rPr lang="en-US" dirty="0" smtClean="0"/>
+              <a:t> remote add origin https://github.com/tiruvedi/firstrepo.git</a:t>
+            </a:r>
+          </a:p>
+          <a:p>
+            <a:r>
+              <a:rPr lang="en-US" dirty="0" smtClean="0"/>
+              <a:t>  583  </a:t>
+            </a:r>
+            <a:r>
+              <a:rPr lang="en-US" dirty="0" err="1" smtClean="0"/>
+              <a:t>git</a:t>
+            </a:r>
+            <a:r>
+              <a:rPr lang="en-US" dirty="0" smtClean="0"/>
+              <a:t> pull origin master</a:t>
+            </a:r>
+          </a:p>
+          <a:p>
+            <a:r>
+              <a:rPr lang="en-US" dirty="0" smtClean="0"/>
+              <a:t>  584  </a:t>
+            </a:r>
+            <a:r>
+              <a:rPr lang="en-US" dirty="0" err="1" smtClean="0"/>
+              <a:t>ll</a:t>
+            </a:r>
+            <a:endParaRPr lang="en-US" dirty="0" smtClean="0"/>
+          </a:p>
+          <a:p>
+            <a:r>
+              <a:rPr lang="en-US" dirty="0" smtClean="0"/>
+              <a:t>  585  </a:t>
+            </a:r>
+            <a:r>
+              <a:rPr lang="en-US" dirty="0" err="1" smtClean="0"/>
+              <a:t>cd</a:t>
+            </a:r>
+            <a:r>
+              <a:rPr lang="en-US" dirty="0" smtClean="0"/>
+              <a:t> .</a:t>
+            </a:r>
+          </a:p>
+          <a:p>
+            <a:r>
+              <a:rPr lang="en-US" dirty="0" smtClean="0"/>
+              <a:t>  586  </a:t>
+            </a:r>
+            <a:r>
+              <a:rPr lang="en-US" dirty="0" err="1" smtClean="0"/>
+              <a:t>cd</a:t>
+            </a:r>
+            <a:r>
+              <a:rPr lang="en-US" dirty="0" smtClean="0"/>
+              <a:t> ..</a:t>
+            </a:r>
+          </a:p>
+          <a:p>
+            <a:r>
+              <a:rPr lang="en-US" dirty="0" smtClean="0"/>
+              <a:t>  587  </a:t>
+            </a:r>
+            <a:r>
+              <a:rPr lang="en-US" dirty="0" err="1" smtClean="0"/>
+              <a:t>cd</a:t>
+            </a:r>
+            <a:r>
+              <a:rPr lang="en-US" dirty="0" smtClean="0"/>
+              <a:t> b</a:t>
+            </a:r>
+          </a:p>
+          <a:p>
+            <a:r>
+              <a:rPr lang="en-US" dirty="0" smtClean="0"/>
+              <a:t>  588  </a:t>
+            </a:r>
+            <a:r>
+              <a:rPr lang="en-US" dirty="0" err="1" smtClean="0"/>
+              <a:t>cd</a:t>
+            </a:r>
+            <a:r>
+              <a:rPr lang="en-US" dirty="0" smtClean="0"/>
+              <a:t> ..</a:t>
+            </a:r>
+          </a:p>
+          <a:p>
+            <a:r>
+              <a:rPr lang="en-US" dirty="0" smtClean="0"/>
+              <a:t>  589  </a:t>
+            </a:r>
+            <a:r>
+              <a:rPr lang="en-US" dirty="0" err="1" smtClean="0"/>
+              <a:t>cd</a:t>
+            </a:r>
+            <a:r>
+              <a:rPr lang="en-US" dirty="0" smtClean="0"/>
+              <a:t> B</a:t>
+            </a:r>
+          </a:p>
+          <a:p>
+            <a:r>
+              <a:rPr lang="en-US" dirty="0" smtClean="0"/>
+              <a:t>  590  </a:t>
+            </a:r>
+            <a:r>
+              <a:rPr lang="en-US" dirty="0" err="1" smtClean="0"/>
+              <a:t>git</a:t>
+            </a:r>
+            <a:r>
+              <a:rPr lang="en-US" dirty="0" smtClean="0"/>
+              <a:t> remote add origin https://github.com/tiruvedi/firstrepo.git</a:t>
+            </a:r>
+          </a:p>
+          <a:p>
+            <a:r>
+              <a:rPr lang="en-US" dirty="0" smtClean="0"/>
+              <a:t>  591  </a:t>
+            </a:r>
+            <a:r>
+              <a:rPr lang="en-US" dirty="0" err="1" smtClean="0"/>
+              <a:t>git</a:t>
+            </a:r>
+            <a:r>
+              <a:rPr lang="en-US" dirty="0" smtClean="0"/>
+              <a:t> pull origin master</a:t>
+            </a:r>
+          </a:p>
+          <a:p>
+            <a:r>
+              <a:rPr lang="en-US" dirty="0" smtClean="0"/>
+              <a:t>  592  </a:t>
+            </a:r>
+            <a:r>
+              <a:rPr lang="en-US" dirty="0" err="1" smtClean="0"/>
+              <a:t>cd</a:t>
+            </a:r>
+            <a:r>
+              <a:rPr lang="en-US" dirty="0" smtClean="0"/>
+              <a:t> </a:t>
+            </a:r>
+            <a:r>
+              <a:rPr lang="en-US" dirty="0" smtClean="0"/>
+              <a:t>..</a:t>
+            </a:r>
+          </a:p>
+          <a:p>
+            <a:r>
+              <a:rPr lang="en-US" dirty="0" smtClean="0"/>
+              <a:t> </a:t>
+            </a:r>
+            <a:r>
+              <a:rPr lang="en-US" dirty="0" smtClean="0"/>
+              <a:t> </a:t>
+            </a:r>
+            <a:r>
+              <a:rPr lang="en-US" dirty="0" smtClean="0"/>
+              <a:t>593  </a:t>
+            </a:r>
+            <a:r>
+              <a:rPr lang="en-US" dirty="0" err="1" smtClean="0"/>
+              <a:t>cd</a:t>
+            </a:r>
+            <a:r>
+              <a:rPr lang="en-US" dirty="0" smtClean="0"/>
+              <a:t> A</a:t>
+            </a:r>
+          </a:p>
+          <a:p>
+            <a:r>
+              <a:rPr lang="en-US" dirty="0" smtClean="0"/>
+              <a:t>  594  </a:t>
+            </a:r>
+            <a:r>
+              <a:rPr lang="en-US" dirty="0" err="1" smtClean="0"/>
+              <a:t>ll</a:t>
+            </a:r>
+            <a:endParaRPr lang="en-US" dirty="0" smtClean="0"/>
+          </a:p>
+          <a:p>
+            <a:r>
+              <a:rPr lang="en-US" dirty="0" smtClean="0"/>
+              <a:t>  595  vi alpha.txt</a:t>
+            </a:r>
+          </a:p>
+          <a:p>
+            <a:r>
+              <a:rPr lang="en-US" dirty="0" smtClean="0"/>
+              <a:t>  596  </a:t>
+            </a:r>
+            <a:r>
+              <a:rPr lang="en-US" dirty="0" err="1" smtClean="0"/>
+              <a:t>git</a:t>
+            </a:r>
+            <a:r>
+              <a:rPr lang="en-US" dirty="0" smtClean="0"/>
+              <a:t> status</a:t>
+            </a:r>
+          </a:p>
+          <a:p>
+            <a:r>
+              <a:rPr lang="en-US" dirty="0" smtClean="0"/>
+              <a:t>  597  </a:t>
+            </a:r>
+            <a:r>
+              <a:rPr lang="en-US" dirty="0" err="1" smtClean="0"/>
+              <a:t>git</a:t>
+            </a:r>
+            <a:r>
+              <a:rPr lang="en-US" dirty="0" smtClean="0"/>
+              <a:t> add .</a:t>
+            </a:r>
+          </a:p>
+          <a:p>
+            <a:r>
+              <a:rPr lang="en-US" dirty="0" smtClean="0"/>
+              <a:t>  598  </a:t>
+            </a:r>
+            <a:r>
+              <a:rPr lang="en-US" dirty="0" err="1" smtClean="0"/>
+              <a:t>git</a:t>
+            </a:r>
+            <a:r>
+              <a:rPr lang="en-US" dirty="0" smtClean="0"/>
+              <a:t> commit -m "commit done from Repo A"</a:t>
+            </a:r>
+          </a:p>
+          <a:p>
+            <a:r>
+              <a:rPr lang="en-US" dirty="0" smtClean="0"/>
+              <a:t>  599  </a:t>
+            </a:r>
+            <a:r>
+              <a:rPr lang="en-US" dirty="0" err="1" smtClean="0"/>
+              <a:t>git</a:t>
+            </a:r>
+            <a:r>
+              <a:rPr lang="en-US" dirty="0" smtClean="0"/>
+              <a:t> push origin master</a:t>
+            </a:r>
+          </a:p>
+          <a:p>
+            <a:r>
+              <a:rPr lang="en-US" dirty="0" smtClean="0"/>
+              <a:t>  600  </a:t>
+            </a:r>
+            <a:r>
+              <a:rPr lang="en-US" dirty="0" err="1" smtClean="0"/>
+              <a:t>cd</a:t>
+            </a:r>
+            <a:r>
+              <a:rPr lang="en-US" dirty="0" smtClean="0"/>
+              <a:t> ..</a:t>
+            </a:r>
+          </a:p>
+          <a:p>
+            <a:r>
+              <a:rPr lang="en-US" dirty="0" smtClean="0"/>
+              <a:t>  601  </a:t>
+            </a:r>
+            <a:r>
+              <a:rPr lang="en-US" dirty="0" err="1" smtClean="0"/>
+              <a:t>cd</a:t>
+            </a:r>
+            <a:r>
+              <a:rPr lang="en-US" dirty="0" smtClean="0"/>
+              <a:t> B</a:t>
+            </a:r>
+          </a:p>
+          <a:p>
+            <a:r>
+              <a:rPr lang="en-US" dirty="0" smtClean="0"/>
+              <a:t>  602  </a:t>
+            </a:r>
+            <a:r>
+              <a:rPr lang="en-US" dirty="0" err="1" smtClean="0"/>
+              <a:t>ll</a:t>
+            </a:r>
+            <a:endParaRPr lang="en-US" dirty="0" smtClean="0"/>
+          </a:p>
+          <a:p>
+            <a:r>
+              <a:rPr lang="en-US" dirty="0" smtClean="0"/>
+              <a:t>  603  vi alpha.txt</a:t>
+            </a:r>
+          </a:p>
+          <a:p>
+            <a:r>
+              <a:rPr lang="en-US" dirty="0" smtClean="0"/>
+              <a:t>  604  vi alpha.txt</a:t>
+            </a:r>
+          </a:p>
+          <a:p>
+            <a:r>
+              <a:rPr lang="en-US" dirty="0" smtClean="0"/>
+              <a:t>  605  </a:t>
+            </a:r>
+            <a:r>
+              <a:rPr lang="en-US" dirty="0" err="1" smtClean="0"/>
+              <a:t>git</a:t>
+            </a:r>
+            <a:r>
+              <a:rPr lang="en-US" dirty="0" smtClean="0"/>
+              <a:t> add .</a:t>
+            </a:r>
+          </a:p>
+          <a:p>
+            <a:r>
+              <a:rPr lang="en-US" dirty="0" smtClean="0"/>
+              <a:t>  606  </a:t>
+            </a:r>
+            <a:r>
+              <a:rPr lang="en-US" dirty="0" err="1" smtClean="0"/>
+              <a:t>git</a:t>
+            </a:r>
+            <a:r>
+              <a:rPr lang="en-US" dirty="0" smtClean="0"/>
+              <a:t> status</a:t>
+            </a:r>
+          </a:p>
+          <a:p>
+            <a:r>
+              <a:rPr lang="en-US" dirty="0" smtClean="0"/>
+              <a:t>  607  </a:t>
+            </a:r>
+            <a:r>
+              <a:rPr lang="en-US" dirty="0" err="1" smtClean="0"/>
+              <a:t>git</a:t>
+            </a:r>
+            <a:r>
+              <a:rPr lang="en-US" dirty="0" smtClean="0"/>
+              <a:t> commit -m "commit from repo B"</a:t>
+            </a:r>
+          </a:p>
+          <a:p>
+            <a:r>
+              <a:rPr lang="en-US" dirty="0" smtClean="0"/>
+              <a:t>  608  </a:t>
+            </a:r>
+            <a:r>
+              <a:rPr lang="en-US" dirty="0" err="1" smtClean="0"/>
+              <a:t>git</a:t>
+            </a:r>
+            <a:r>
+              <a:rPr lang="en-US" dirty="0" smtClean="0"/>
+              <a:t> push origin master</a:t>
+            </a:r>
+          </a:p>
+          <a:p>
+            <a:r>
+              <a:rPr lang="en-US" dirty="0" smtClean="0"/>
+              <a:t>  609  </a:t>
+            </a:r>
+            <a:r>
+              <a:rPr lang="en-US" dirty="0" err="1" smtClean="0"/>
+              <a:t>git</a:t>
+            </a:r>
+            <a:r>
+              <a:rPr lang="en-US" dirty="0" smtClean="0"/>
+              <a:t> pull --rebase origin master</a:t>
+            </a:r>
+          </a:p>
+          <a:p>
+            <a:r>
+              <a:rPr lang="en-US" dirty="0" smtClean="0"/>
+              <a:t>  610  </a:t>
+            </a:r>
+            <a:r>
+              <a:rPr lang="en-US" dirty="0" err="1" smtClean="0"/>
+              <a:t>git</a:t>
+            </a:r>
+            <a:r>
+              <a:rPr lang="en-US" dirty="0" smtClean="0"/>
+              <a:t> </a:t>
+            </a:r>
+            <a:r>
+              <a:rPr lang="en-US" dirty="0" err="1" smtClean="0"/>
+              <a:t>mergetool</a:t>
+            </a:r>
+            <a:endParaRPr lang="en-US" dirty="0" smtClean="0"/>
+          </a:p>
+          <a:p>
+            <a:r>
+              <a:rPr lang="en-US" dirty="0" smtClean="0"/>
+              <a:t>  611  </a:t>
+            </a:r>
+            <a:r>
+              <a:rPr lang="en-US" dirty="0" err="1" smtClean="0"/>
+              <a:t>git</a:t>
+            </a:r>
+            <a:r>
+              <a:rPr lang="en-US" dirty="0" smtClean="0"/>
+              <a:t> rebase --continue</a:t>
+            </a:r>
+          </a:p>
+          <a:p>
+            <a:r>
+              <a:rPr lang="pt-BR" dirty="0" smtClean="0"/>
+              <a:t>  612  git log -n 2</a:t>
+            </a:r>
+          </a:p>
+          <a:p>
+            <a:r>
+              <a:rPr lang="en-US" dirty="0" smtClean="0"/>
+              <a:t>  613  </a:t>
+            </a:r>
+            <a:r>
+              <a:rPr lang="en-US" dirty="0" err="1" smtClean="0"/>
+              <a:t>git</a:t>
+            </a:r>
+            <a:r>
+              <a:rPr lang="en-US" dirty="0" smtClean="0"/>
+              <a:t> push origin master</a:t>
+            </a:r>
+          </a:p>
+          <a:p>
+            <a:endParaRPr lang="en-US" dirty="0"/>
+          </a:p>
+        </p:txBody>
+      </p:sp>
+    </p:spTree>
+  </p:cSld>
+  <p:clrMapOvr>
+    <a:masterClrMapping/>
+  </p:clrMapOvr>
+</p:sld>
+</file>
+
+<file path=ppt/slides/slide3.xml><?xml version="1.0" encoding="utf-8"?>
+<p:sld xmlns:a="http://schemas.openxmlformats.org/drawingml/2006/main" xmlns:r="http://schemas.openxmlformats.org/officeDocument/2006/relationships" xmlns:p="http://schemas.openxmlformats.org/presentationml/2006/main" show="0">
+  <p:cSld>
+    <p:spTree>
+      <p:nvGrpSpPr>
+        <p:cNvPr id="1" name=""/>
+        <p:cNvGrpSpPr/>
+        <p:nvPr/>
+      </p:nvGrpSpPr>
+      <p:grpSpPr>
+        <a:xfrm>
+          <a:off x="0" y="0"/>
+          <a:ext cx="0" cy="0"/>
+          <a:chOff x="0" y="0"/>
+          <a:chExt cx="0" cy="0"/>
+        </a:xfrm>
+      </p:grpSpPr>
+      <p:sp>
+        <p:nvSpPr>
+          <p:cNvPr id="2" name="Title 1"/>
+          <p:cNvSpPr>
+            <a:spLocks noGrp="1"/>
+          </p:cNvSpPr>
+          <p:nvPr>
+            <p:ph type="title"/>
+          </p:nvPr>
+        </p:nvSpPr>
+        <p:spPr/>
+        <p:txBody>
+          <a:bodyPr>
+            <a:normAutofit/>
+          </a:bodyPr>
+          <a:lstStyle/>
+          <a:p>
+            <a:r>
+              <a:rPr lang="en-US" dirty="0" smtClean="0"/>
+              <a:t>What is VCS</a:t>
+            </a:r>
+            <a:r>
+              <a:rPr lang="en-US" sz="1600" dirty="0" smtClean="0"/>
+              <a:t>(Version control system)</a:t>
+            </a:r>
+            <a:endParaRPr lang="en-US" dirty="0"/>
+          </a:p>
+        </p:txBody>
+      </p:sp>
+      <p:sp>
+        <p:nvSpPr>
+          <p:cNvPr id="3" name="Content Placeholder 2"/>
+          <p:cNvSpPr>
+            <a:spLocks noGrp="1"/>
+          </p:cNvSpPr>
+          <p:nvPr>
+            <p:ph idx="1"/>
+          </p:nvPr>
+        </p:nvSpPr>
+        <p:spPr/>
+        <p:txBody>
+          <a:bodyPr>
+            <a:normAutofit/>
+          </a:bodyPr>
+          <a:lstStyle/>
+          <a:p>
+            <a:r>
+              <a:rPr lang="en-US" sz="2000" dirty="0" smtClean="0"/>
+              <a:t>The management of modifications to documents, computer programs, huge websites, and other collections of information is known as version control, sometimes known as revision control or source control. Each revision has a timestamp and the name of the person who modified it. Revisions can be compared, restored, and merged with some file formats. [1]</a:t>
+            </a:r>
+          </a:p>
+          <a:p>
+            <a:r>
+              <a:rPr lang="en-US" sz="2000" dirty="0" smtClean="0"/>
+              <a:t>VCSs are most typically used as stand-alone applications, but they can also be embedded in other types of software, such as integrated development environments (IDEs).</a:t>
+            </a:r>
+          </a:p>
+          <a:p>
+            <a:endParaRPr lang="en-US" sz="1800" dirty="0"/>
+          </a:p>
+        </p:txBody>
+      </p:sp>
+    </p:spTree>
+  </p:cSld>
+  <p:clrMapOvr>
+    <a:masterClrMapping/>
+  </p:clrMapOvr>
+  <p:transition/>
   <p:timing>
     <p:tnLst>
       <p:par>
@@ -5752,7 +6663,7 @@
 </file>
 
 <file path=ppt/slides/slide5.xml><?xml version="1.0" encoding="utf-8"?>
-<p:sld xmlns:a="http://schemas.openxmlformats.org/drawingml/2006/main" xmlns:r="http://schemas.openxmlformats.org/officeDocument/2006/relationships" xmlns:p="http://schemas.openxmlformats.org/presentationml/2006/main">
+<p:sld xmlns:a="http://schemas.openxmlformats.org/drawingml/2006/main" xmlns:r="http://schemas.openxmlformats.org/officeDocument/2006/relationships" xmlns:p="http://schemas.openxmlformats.org/presentationml/2006/main" show="0">
   <p:cSld>
     <p:spTree>
       <p:nvGrpSpPr>
@@ -5843,6 +6754,7 @@
   <p:clrMapOvr>
     <a:masterClrMapping/>
   </p:clrMapOvr>
+  <p:transition/>
   <p:timing>
     <p:tnLst>
       <p:par>
@@ -5956,7 +6868,7 @@
 </file>
 
 <file path=ppt/slides/slide7.xml><?xml version="1.0" encoding="utf-8"?>
-<p:sld xmlns:a="http://schemas.openxmlformats.org/drawingml/2006/main" xmlns:r="http://schemas.openxmlformats.org/officeDocument/2006/relationships" xmlns:p="http://schemas.openxmlformats.org/presentationml/2006/main">
+<p:sld xmlns:a="http://schemas.openxmlformats.org/drawingml/2006/main" xmlns:r="http://schemas.openxmlformats.org/officeDocument/2006/relationships" xmlns:p="http://schemas.openxmlformats.org/presentationml/2006/main" show="0">
   <p:cSld>
     <p:spTree>
       <p:nvGrpSpPr>
@@ -6034,7 +6946,11 @@
             </a:r>
             <a:r>
               <a:rPr lang="en-US" b="1" dirty="0" smtClean="0"/>
-              <a:t>in centralized version control, the versions are saved in the remote repository, while in distributed version control, versions can be saved in the remote repository as well as in local repositories of the local machines.</a:t>
+              <a:t>in centralized version control, the versions are saved in the remote repository, while in distributed version control, versions can be saved in the remote repository as well as in local repositories of the local machines</a:t>
+            </a:r>
+            <a:r>
+              <a:rPr lang="en-US" b="1" dirty="0" smtClean="0"/>
+              <a:t>.`</a:t>
             </a:r>
             <a:endParaRPr lang="en-US" dirty="0"/>
           </a:p>
@@ -6045,6 +6961,7 @@
   <p:clrMapOvr>
     <a:masterClrMapping/>
   </p:clrMapOvr>
+  <p:transition/>
   <p:timing>
     <p:tnLst>
       <p:par>
@@ -6082,67 +6999,26 @@
             <p:ph type="title"/>
           </p:nvPr>
         </p:nvSpPr>
-        <p:spPr>
-          <a:xfrm>
-            <a:off x="285720" y="571480"/>
-            <a:ext cx="7239000" cy="462932"/>
-          </a:xfrm>
-        </p:spPr>
+        <p:spPr/>
         <p:txBody>
           <a:bodyPr>
-            <a:normAutofit/>
+            <a:normAutofit fontScale="90000"/>
           </a:bodyPr>
           <a:lstStyle/>
           <a:p>
             <a:r>
-              <a:rPr lang="en-US" sz="2400" dirty="0" smtClean="0">
-                <a:solidFill>
-                  <a:schemeClr val="accent3">
-                    <a:lumMod val="40000"/>
-                    <a:lumOff val="60000"/>
-                  </a:schemeClr>
-                </a:solidFill>
-              </a:rPr>
-              <a:t>Centralized </a:t>
-            </a:r>
-            <a:r>
-              <a:rPr lang="en-US" sz="2400" dirty="0" err="1" smtClean="0">
-                <a:solidFill>
-                  <a:schemeClr val="accent3">
-                    <a:lumMod val="40000"/>
-                    <a:lumOff val="60000"/>
-                  </a:schemeClr>
-                </a:solidFill>
-              </a:rPr>
-              <a:t>vs</a:t>
-            </a:r>
-            <a:r>
-              <a:rPr lang="en-US" sz="2400" dirty="0" smtClean="0">
-                <a:solidFill>
-                  <a:schemeClr val="accent3">
-                    <a:lumMod val="40000"/>
-                    <a:lumOff val="60000"/>
-                  </a:schemeClr>
-                </a:solidFill>
-              </a:rPr>
-              <a:t> Distributed Version Control</a:t>
-            </a:r>
-            <a:endParaRPr lang="en-US" sz="2400" dirty="0">
-              <a:solidFill>
-                <a:schemeClr val="accent3">
-                  <a:lumMod val="40000"/>
-                  <a:lumOff val="60000"/>
-                </a:schemeClr>
-              </a:solidFill>
-            </a:endParaRPr>
+              <a:rPr lang="en-US" dirty="0" smtClean="0"/>
+              <a:t>Types of Version Control Systems</a:t>
+            </a:r>
+            <a:endParaRPr lang="en-US" dirty="0"/>
           </a:p>
         </p:txBody>
       </p:sp>
       <p:pic>
         <p:nvPicPr>
-          <p:cNvPr id="1026" name="Picture 2"/>
+          <p:cNvPr id="5" name="Content Placeholder 4" descr="screenshot 2024-08-13_cvsVSdvsc.png"/>
           <p:cNvPicPr>
-            <a:picLocks noGrp="1" noChangeAspect="1" noChangeArrowheads="1"/>
+            <a:picLocks noGrp="1" noChangeAspect="1"/>
           </p:cNvPicPr>
           <p:nvPr>
             <p:ph idx="1"/>
@@ -6150,27 +7026,15 @@
         </p:nvPicPr>
         <p:blipFill>
           <a:blip r:embed="rId2"/>
-          <a:srcRect/>
           <a:stretch>
             <a:fillRect/>
           </a:stretch>
         </p:blipFill>
-        <p:spPr bwMode="auto">
+        <p:spPr>
           <a:xfrm>
-            <a:off x="2000232" y="1357298"/>
-            <a:ext cx="4256074" cy="5222655"/>
+            <a:off x="699616" y="2470726"/>
+            <a:ext cx="6754168" cy="3124636"/>
           </a:xfrm>
-          <a:prstGeom prst="rect">
-            <a:avLst/>
-          </a:prstGeom>
-          <a:noFill/>
-          <a:ln w="9525">
-            <a:noFill/>
-            <a:miter lim="800000"/>
-            <a:headEnd/>
-            <a:tailEnd/>
-          </a:ln>
-          <a:effectLst/>
         </p:spPr>
       </p:pic>
     </p:spTree>
@@ -6215,26 +7079,67 @@
             <p:ph type="title"/>
           </p:nvPr>
         </p:nvSpPr>
-        <p:spPr/>
+        <p:spPr>
+          <a:xfrm>
+            <a:off x="285720" y="571480"/>
+            <a:ext cx="7239000" cy="462932"/>
+          </a:xfrm>
+        </p:spPr>
         <p:txBody>
           <a:bodyPr>
-            <a:normAutofit fontScale="90000"/>
+            <a:normAutofit/>
           </a:bodyPr>
           <a:lstStyle/>
           <a:p>
             <a:r>
-              <a:rPr lang="en-US" dirty="0" smtClean="0"/>
-              <a:t>Types of Version Control Systems</a:t>
-            </a:r>
-            <a:endParaRPr lang="en-US" dirty="0"/>
+              <a:rPr lang="en-US" sz="2400" dirty="0" smtClean="0">
+                <a:solidFill>
+                  <a:schemeClr val="accent3">
+                    <a:lumMod val="40000"/>
+                    <a:lumOff val="60000"/>
+                  </a:schemeClr>
+                </a:solidFill>
+              </a:rPr>
+              <a:t>Centralized </a:t>
+            </a:r>
+            <a:r>
+              <a:rPr lang="en-US" sz="2400" dirty="0" err="1" smtClean="0">
+                <a:solidFill>
+                  <a:schemeClr val="accent3">
+                    <a:lumMod val="40000"/>
+                    <a:lumOff val="60000"/>
+                  </a:schemeClr>
+                </a:solidFill>
+              </a:rPr>
+              <a:t>vs</a:t>
+            </a:r>
+            <a:r>
+              <a:rPr lang="en-US" sz="2400" dirty="0" smtClean="0">
+                <a:solidFill>
+                  <a:schemeClr val="accent3">
+                    <a:lumMod val="40000"/>
+                    <a:lumOff val="60000"/>
+                  </a:schemeClr>
+                </a:solidFill>
+              </a:rPr>
+              <a:t> Distributed Version Control</a:t>
+            </a:r>
+            <a:endParaRPr lang="en-US" sz="2400" dirty="0">
+              <a:solidFill>
+                <a:schemeClr val="accent3">
+                  <a:lumMod val="40000"/>
+                  <a:lumOff val="60000"/>
+                </a:schemeClr>
+              </a:solidFill>
+            </a:endParaRPr>
           </a:p>
         </p:txBody>
       </p:sp>
       <p:pic>
         <p:nvPicPr>
-          <p:cNvPr id="5" name="Content Placeholder 4" descr="screenshot 2024-08-13_cvsVSdvsc.png"/>
+          <p:cNvPr id="1026" name="Picture 2"/>
           <p:cNvPicPr>
-            <a:picLocks noGrp="1" noChangeAspect="1"/>
+            <a:picLocks noGrp="1" noChangeAspect="1" noChangeArrowheads="1"/>
           </p:cNvPicPr>
           <p:nvPr>
             <p:ph idx="1"/>
@@ -6242,15 +7147,27 @@
         </p:nvPicPr>
         <p:blipFill>
           <a:blip r:embed="rId2"/>
+          <a:srcRect/>
           <a:stretch>
             <a:fillRect/>
           </a:stretch>
         </p:blipFill>
-        <p:spPr>
+        <p:spPr bwMode="auto">
           <a:xfrm>
-            <a:off x="699616" y="2470726"/>
-            <a:ext cx="6754168" cy="3124636"/>
+            <a:off x="2000232" y="1357298"/>
+            <a:ext cx="4256074" cy="5222655"/>
           </a:xfrm>
+          <a:prstGeom prst="rect">
+            <a:avLst/>
+          </a:prstGeom>
+          <a:noFill/>
+          <a:ln w="9525">
+            <a:noFill/>
+            <a:miter lim="800000"/>
+            <a:headEnd/>
+            <a:tailEnd/>
+          </a:ln>
+          <a:effectLst/>
         </p:spPr>
       </p:pic>
     </p:spTree>

</xml_diff>